<commit_message>
kubebuilder, operator sdk slides
</commit_message>
<xml_diff>
--- a/Genetec ConnectDev Kubernetes Extenstion Points 20181206.pptx
+++ b/Genetec ConnectDev Kubernetes Extenstion Points 20181206.pptx
@@ -6699,7 +6699,11 @@
             </a:br>
             <a:r>
               <a:rPr lang="en-US" sz="3000" dirty="0"/>
-              <a:t>With Deep Dive into CRDs</a:t>
+              <a:t>With Deep Dive into Custom </a:t>
+            </a:r>
+            <a:r>
+              <a:rPr lang="en-US" sz="3000"/>
+              <a:t>Resource Definitions</a:t>
             </a:r>
             <a:br>
               <a:rPr lang="en-US" sz="4000" dirty="0"/>
@@ -15742,6 +15746,35 @@
 </file>
 
 <file path=customXml/item1.xml><?xml version="1.0" encoding="utf-8"?>
+<p:properties xmlns:p="http://schemas.microsoft.com/office/2006/metadata/properties" xmlns:xsi="http://www.w3.org/2001/XMLSchema-instance" xmlns:pc="http://schemas.microsoft.com/office/infopath/2007/PartnerControls">
+  <documentManagement>
+    <MigrationWizId xmlns="2d5b61be-a37e-4312-abe1-15bdea23a843" xsi:nil="true"/>
+    <MigrationWizIdDocumentLibraryPermissions xmlns="2d5b61be-a37e-4312-abe1-15bdea23a843" xsi:nil="true"/>
+    <MigrationWizIdSecurityGroups xmlns="2d5b61be-a37e-4312-abe1-15bdea23a843" xsi:nil="true"/>
+    <MigrationWizIdPermissions xmlns="2d5b61be-a37e-4312-abe1-15bdea23a843" xsi:nil="true"/>
+    <MigrationWizIdPermissionLevels xmlns="2d5b61be-a37e-4312-abe1-15bdea23a843" xsi:nil="true"/>
+    <SharedWithUsers xmlns="05064933-9efc-498e-b7e4-a3b243683d34">
+      <UserInfo>
+        <DisplayName>Dan Partington</DisplayName>
+        <AccountId>262</AccountId>
+        <AccountType/>
+      </UserInfo>
+      <UserInfo>
+        <DisplayName>David Suydam</DisplayName>
+        <AccountId>18</AccountId>
+        <AccountType/>
+      </UserInfo>
+      <UserInfo>
+        <DisplayName>Jungho Kim</DisplayName>
+        <AccountId>44</AccountId>
+        <AccountType/>
+      </UserInfo>
+    </SharedWithUsers>
+  </documentManagement>
+</p:properties>
+</file>
+
+<file path=customXml/item2.xml><?xml version="1.0" encoding="utf-8"?>
 <ct:contentTypeSchema xmlns:ct="http://schemas.microsoft.com/office/2006/metadata/contentType" xmlns:ma="http://schemas.microsoft.com/office/2006/metadata/properties/metaAttributes" ct:_="" ma:_="" ma:contentTypeName="Document" ma:contentTypeID="0x01010057833BCAEDDC9B4B8234007A0D5A3354" ma:contentTypeVersion="" ma:contentTypeDescription="Create a new document." ma:contentTypeScope="" ma:versionID="95abf1b123b0dee93d182cc9c3ab7e14">
   <xsd:schema xmlns:xsd="http://www.w3.org/2001/XMLSchema" xmlns:xs="http://www.w3.org/2001/XMLSchema" xmlns:p="http://schemas.microsoft.com/office/2006/metadata/properties" xmlns:ns2="05064933-9efc-498e-b7e4-a3b243683d34" xmlns:ns3="2d5b61be-a37e-4312-abe1-15bdea23a843" targetNamespace="http://schemas.microsoft.com/office/2006/metadata/properties" ma:root="true" ma:fieldsID="60e1a51a09f1da3338308970e3fda1ff" ns2:_="" ns3:_="">
     <xsd:import namespace="05064933-9efc-498e-b7e4-a3b243683d34"/>
@@ -15960,35 +15993,6 @@
 </ct:contentTypeSchema>
 </file>
 
-<file path=customXml/item2.xml><?xml version="1.0" encoding="utf-8"?>
-<p:properties xmlns:p="http://schemas.microsoft.com/office/2006/metadata/properties" xmlns:xsi="http://www.w3.org/2001/XMLSchema-instance" xmlns:pc="http://schemas.microsoft.com/office/infopath/2007/PartnerControls">
-  <documentManagement>
-    <MigrationWizId xmlns="2d5b61be-a37e-4312-abe1-15bdea23a843" xsi:nil="true"/>
-    <MigrationWizIdDocumentLibraryPermissions xmlns="2d5b61be-a37e-4312-abe1-15bdea23a843" xsi:nil="true"/>
-    <MigrationWizIdSecurityGroups xmlns="2d5b61be-a37e-4312-abe1-15bdea23a843" xsi:nil="true"/>
-    <MigrationWizIdPermissions xmlns="2d5b61be-a37e-4312-abe1-15bdea23a843" xsi:nil="true"/>
-    <MigrationWizIdPermissionLevels xmlns="2d5b61be-a37e-4312-abe1-15bdea23a843" xsi:nil="true"/>
-    <SharedWithUsers xmlns="05064933-9efc-498e-b7e4-a3b243683d34">
-      <UserInfo>
-        <DisplayName>Dan Partington</DisplayName>
-        <AccountId>262</AccountId>
-        <AccountType/>
-      </UserInfo>
-      <UserInfo>
-        <DisplayName>David Suydam</DisplayName>
-        <AccountId>18</AccountId>
-        <AccountType/>
-      </UserInfo>
-      <UserInfo>
-        <DisplayName>Jungho Kim</DisplayName>
-        <AccountId>44</AccountId>
-        <AccountType/>
-      </UserInfo>
-    </SharedWithUsers>
-  </documentManagement>
-</p:properties>
-</file>
-
 <file path=customXml/item3.xml><?xml version="1.0" encoding="utf-8"?>
 <?mso-contentType ?>
 <FormTemplates xmlns="http://schemas.microsoft.com/sharepoint/v3/contenttype/forms">
@@ -15999,6 +16003,25 @@
 </file>
 
 <file path=customXml/itemProps1.xml><?xml version="1.0" encoding="utf-8"?>
+<ds:datastoreItem xmlns:ds="http://schemas.openxmlformats.org/officeDocument/2006/customXml" ds:itemID="{EE4D57EC-D461-49F3-AF81-829A17CDE8F4}">
+  <ds:schemaRefs>
+    <ds:schemaRef ds:uri="05064933-9efc-498e-b7e4-a3b243683d34"/>
+    <ds:schemaRef ds:uri="2d5b61be-a37e-4312-abe1-15bdea23a843"/>
+    <ds:schemaRef ds:uri="609ca095-6e66-4f2b-8f0c-abdfeb59f5dd"/>
+    <ds:schemaRef ds:uri="bd26bed5-1db0-4ec0-9fc2-62222bc303bf"/>
+    <ds:schemaRef ds:uri="http://purl.org/dc/dcmitype/"/>
+    <ds:schemaRef ds:uri="http://purl.org/dc/elements/1.1/"/>
+    <ds:schemaRef ds:uri="http://purl.org/dc/terms/"/>
+    <ds:schemaRef ds:uri="http://schemas.microsoft.com/office/2006/documentManagement/types"/>
+    <ds:schemaRef ds:uri="http://schemas.microsoft.com/office/2006/metadata/properties"/>
+    <ds:schemaRef ds:uri="http://schemas.microsoft.com/office/infopath/2007/PartnerControls"/>
+    <ds:schemaRef ds:uri="http://schemas.openxmlformats.org/package/2006/metadata/core-properties"/>
+    <ds:schemaRef ds:uri="http://www.w3.org/XML/1998/namespace"/>
+  </ds:schemaRefs>
+</ds:datastoreItem>
+</file>
+
+<file path=customXml/itemProps2.xml><?xml version="1.0" encoding="utf-8"?>
 <ds:datastoreItem xmlns:ds="http://schemas.openxmlformats.org/officeDocument/2006/customXml" ds:itemID="{77511DE2-9E56-408D-9E57-5BAED7657698}">
   <ds:schemaRefs>
     <ds:schemaRef ds:uri="05064933-9efc-498e-b7e4-a3b243683d34"/>
@@ -16017,25 +16040,6 @@
 </ds:datastoreItem>
 </file>
 
-<file path=customXml/itemProps2.xml><?xml version="1.0" encoding="utf-8"?>
-<ds:datastoreItem xmlns:ds="http://schemas.openxmlformats.org/officeDocument/2006/customXml" ds:itemID="{EE4D57EC-D461-49F3-AF81-829A17CDE8F4}">
-  <ds:schemaRefs>
-    <ds:schemaRef ds:uri="05064933-9efc-498e-b7e4-a3b243683d34"/>
-    <ds:schemaRef ds:uri="2d5b61be-a37e-4312-abe1-15bdea23a843"/>
-    <ds:schemaRef ds:uri="609ca095-6e66-4f2b-8f0c-abdfeb59f5dd"/>
-    <ds:schemaRef ds:uri="bd26bed5-1db0-4ec0-9fc2-62222bc303bf"/>
-    <ds:schemaRef ds:uri="http://purl.org/dc/dcmitype/"/>
-    <ds:schemaRef ds:uri="http://purl.org/dc/elements/1.1/"/>
-    <ds:schemaRef ds:uri="http://purl.org/dc/terms/"/>
-    <ds:schemaRef ds:uri="http://schemas.microsoft.com/office/2006/documentManagement/types"/>
-    <ds:schemaRef ds:uri="http://schemas.microsoft.com/office/2006/metadata/properties"/>
-    <ds:schemaRef ds:uri="http://schemas.microsoft.com/office/infopath/2007/PartnerControls"/>
-    <ds:schemaRef ds:uri="http://schemas.openxmlformats.org/package/2006/metadata/core-properties"/>
-    <ds:schemaRef ds:uri="http://www.w3.org/XML/1998/namespace"/>
-  </ds:schemaRefs>
-</ds:datastoreItem>
-</file>
-
 <file path=customXml/itemProps3.xml><?xml version="1.0" encoding="utf-8"?>
 <ds:datastoreItem xmlns:ds="http://schemas.openxmlformats.org/officeDocument/2006/customXml" ds:itemID="{E213236A-A5DF-4D28-9A47-90121E3AA9E8}">
   <ds:schemaRefs>

</xml_diff>